<commit_message>
Fix typos in lidvae
</commit_message>
<xml_diff>
--- a/memo & indiv meeting/240502 vq-vae & lid-vae.pptx
+++ b/memo & indiv meeting/240502 vq-vae & lid-vae.pptx
@@ -277,7 +277,7 @@
           <a:p>
             <a:fld id="{AEDC195A-05C2-4574-9B7F-0324A4B1A207}" type="datetimeFigureOut">
               <a:rPr lang="ko-KR" altLang="en-US" smtClean="0"/>
-              <a:t>2024-05-02</a:t>
+              <a:t>2024-05-03</a:t>
             </a:fld>
             <a:endParaRPr lang="ko-KR" altLang="en-US"/>
           </a:p>
@@ -475,7 +475,7 @@
           <a:p>
             <a:fld id="{AEDC195A-05C2-4574-9B7F-0324A4B1A207}" type="datetimeFigureOut">
               <a:rPr lang="ko-KR" altLang="en-US" smtClean="0"/>
-              <a:t>2024-05-02</a:t>
+              <a:t>2024-05-03</a:t>
             </a:fld>
             <a:endParaRPr lang="ko-KR" altLang="en-US"/>
           </a:p>
@@ -683,7 +683,7 @@
           <a:p>
             <a:fld id="{AEDC195A-05C2-4574-9B7F-0324A4B1A207}" type="datetimeFigureOut">
               <a:rPr lang="ko-KR" altLang="en-US" smtClean="0"/>
-              <a:t>2024-05-02</a:t>
+              <a:t>2024-05-03</a:t>
             </a:fld>
             <a:endParaRPr lang="ko-KR" altLang="en-US"/>
           </a:p>
@@ -926,7 +926,7 @@
           <a:p>
             <a:fld id="{AEDC195A-05C2-4574-9B7F-0324A4B1A207}" type="datetimeFigureOut">
               <a:rPr lang="ko-KR" altLang="en-US" smtClean="0"/>
-              <a:t>2024-05-02</a:t>
+              <a:t>2024-05-03</a:t>
             </a:fld>
             <a:endParaRPr lang="ko-KR" altLang="en-US"/>
           </a:p>
@@ -1201,7 +1201,7 @@
           <a:p>
             <a:fld id="{AEDC195A-05C2-4574-9B7F-0324A4B1A207}" type="datetimeFigureOut">
               <a:rPr lang="ko-KR" altLang="en-US" smtClean="0"/>
-              <a:t>2024-05-02</a:t>
+              <a:t>2024-05-03</a:t>
             </a:fld>
             <a:endParaRPr lang="ko-KR" altLang="en-US"/>
           </a:p>
@@ -1466,7 +1466,7 @@
           <a:p>
             <a:fld id="{AEDC195A-05C2-4574-9B7F-0324A4B1A207}" type="datetimeFigureOut">
               <a:rPr lang="ko-KR" altLang="en-US" smtClean="0"/>
-              <a:t>2024-05-02</a:t>
+              <a:t>2024-05-03</a:t>
             </a:fld>
             <a:endParaRPr lang="ko-KR" altLang="en-US"/>
           </a:p>
@@ -1878,7 +1878,7 @@
           <a:p>
             <a:fld id="{AEDC195A-05C2-4574-9B7F-0324A4B1A207}" type="datetimeFigureOut">
               <a:rPr lang="ko-KR" altLang="en-US" smtClean="0"/>
-              <a:t>2024-05-02</a:t>
+              <a:t>2024-05-03</a:t>
             </a:fld>
             <a:endParaRPr lang="ko-KR" altLang="en-US"/>
           </a:p>
@@ -2019,7 +2019,7 @@
           <a:p>
             <a:fld id="{AEDC195A-05C2-4574-9B7F-0324A4B1A207}" type="datetimeFigureOut">
               <a:rPr lang="ko-KR" altLang="en-US" smtClean="0"/>
-              <a:t>2024-05-02</a:t>
+              <a:t>2024-05-03</a:t>
             </a:fld>
             <a:endParaRPr lang="ko-KR" altLang="en-US"/>
           </a:p>
@@ -2132,7 +2132,7 @@
           <a:p>
             <a:fld id="{AEDC195A-05C2-4574-9B7F-0324A4B1A207}" type="datetimeFigureOut">
               <a:rPr lang="ko-KR" altLang="en-US" smtClean="0"/>
-              <a:t>2024-05-02</a:t>
+              <a:t>2024-05-03</a:t>
             </a:fld>
             <a:endParaRPr lang="ko-KR" altLang="en-US"/>
           </a:p>
@@ -2443,7 +2443,7 @@
           <a:p>
             <a:fld id="{AEDC195A-05C2-4574-9B7F-0324A4B1A207}" type="datetimeFigureOut">
               <a:rPr lang="ko-KR" altLang="en-US" smtClean="0"/>
-              <a:t>2024-05-02</a:t>
+              <a:t>2024-05-03</a:t>
             </a:fld>
             <a:endParaRPr lang="ko-KR" altLang="en-US"/>
           </a:p>
@@ -2731,7 +2731,7 @@
           <a:p>
             <a:fld id="{AEDC195A-05C2-4574-9B7F-0324A4B1A207}" type="datetimeFigureOut">
               <a:rPr lang="ko-KR" altLang="en-US" smtClean="0"/>
-              <a:t>2024-05-02</a:t>
+              <a:t>2024-05-03</a:t>
             </a:fld>
             <a:endParaRPr lang="ko-KR" altLang="en-US"/>
           </a:p>
@@ -2972,7 +2972,7 @@
           <a:p>
             <a:fld id="{AEDC195A-05C2-4574-9B7F-0324A4B1A207}" type="datetimeFigureOut">
               <a:rPr lang="ko-KR" altLang="en-US" smtClean="0"/>
-              <a:t>2024-05-02</a:t>
+              <a:t>2024-05-03</a:t>
             </a:fld>
             <a:endParaRPr lang="ko-KR" altLang="en-US"/>
           </a:p>
@@ -3606,7 +3606,15 @@
           <a:p>
             <a:r>
               <a:rPr lang="en-US" altLang="ko-KR" dirty="0"/>
-              <a:t>Will the canceled lab seminar be held again soon?</a:t>
+              <a:t>Will the canceled lab seminar </a:t>
+            </a:r>
+            <a:r>
+              <a:rPr lang="en-US" altLang="ko-KR"/>
+              <a:t>be held soon</a:t>
+            </a:r>
+            <a:r>
+              <a:rPr lang="en-US" altLang="ko-KR" dirty="0"/>
+              <a:t>?</a:t>
             </a:r>
           </a:p>
           <a:p>
@@ -3676,8 +3684,8 @@
           </a:p>
         </p:txBody>
       </p:sp>
-      <mc:AlternateContent xmlns:mc="http://schemas.openxmlformats.org/markup-compatibility/2006">
-        <mc:Choice xmlns:a14="http://schemas.microsoft.com/office/drawing/2010/main" Requires="a14">
+      <mc:AlternateContent xmlns:mc="http://schemas.openxmlformats.org/markup-compatibility/2006" xmlns:a14="http://schemas.microsoft.com/office/drawing/2010/main">
+        <mc:Choice Requires="a14">
           <p:sp>
             <p:nvSpPr>
               <p:cNvPr id="3" name="내용 개체 틀 2">
@@ -4179,7 +4187,7 @@
             </p:txBody>
           </p:sp>
         </mc:Choice>
-        <mc:Fallback>
+        <mc:Fallback xmlns="">
           <p:sp>
             <p:nvSpPr>
               <p:cNvPr id="3" name="내용 개체 틀 2">
@@ -4278,8 +4286,8 @@
           </a:p>
         </p:txBody>
       </p:sp>
-      <mc:AlternateContent xmlns:mc="http://schemas.openxmlformats.org/markup-compatibility/2006">
-        <mc:Choice xmlns:a14="http://schemas.microsoft.com/office/drawing/2010/main" Requires="a14">
+      <mc:AlternateContent xmlns:mc="http://schemas.openxmlformats.org/markup-compatibility/2006" xmlns:a14="http://schemas.microsoft.com/office/drawing/2010/main">
+        <mc:Choice Requires="a14">
           <p:sp>
             <p:nvSpPr>
               <p:cNvPr id="3" name="내용 개체 틀 2">
@@ -4695,22 +4703,18 @@
                 </a14:m>
                 <a:r>
                   <a:rPr lang="en-US" altLang="ko-KR" dirty="0"/>
-                  <a:t> (posterior collapse)</a:t>
+                  <a:t> (posterior </a:t>
                 </a:r>
-              </a:p>
-              <a:p>
+                <a:r>
+                  <a:rPr lang="en-US" altLang="ko-KR"/>
+                  <a:t>collapse)</a:t>
+                </a:r>
                 <a:endParaRPr lang="en-US" altLang="ko-KR" dirty="0"/>
-              </a:p>
-              <a:p>
-                <a:r>
-                  <a:rPr lang="en-US" altLang="ko-KR" dirty="0"/>
-                  <a:t>Practically, sampling and recons are mediocre in balance with MSE</a:t>
-                </a:r>
               </a:p>
             </p:txBody>
           </p:sp>
         </mc:Choice>
-        <mc:Fallback>
+        <mc:Fallback xmlns="">
           <p:sp>
             <p:nvSpPr>
               <p:cNvPr id="3" name="내용 개체 틀 2">
@@ -4880,7 +4884,23 @@
               <a:p>
                 <a:r>
                   <a:rPr lang="en-US" altLang="ko-KR" dirty="0"/>
-                  <a:t>VAE is treated as just Regularized AE </a:t>
+                  <a:t>VAE is treated </a:t>
+                </a:r>
+                <a:r>
+                  <a:rPr lang="en-US" altLang="ko-KR"/>
+                  <a:t>as one</a:t>
+                </a:r>
+                <a:r>
+                  <a:rPr lang="ko-KR" altLang="en-US"/>
+                  <a:t> </a:t>
+                </a:r>
+                <a:r>
+                  <a:rPr lang="en-US" altLang="ko-KR"/>
+                  <a:t>of </a:t>
+                </a:r>
+                <a:r>
+                  <a:rPr lang="en-US" altLang="ko-KR" dirty="0"/>
+                  <a:t>Regularized AE </a:t>
                 </a:r>
                 <a:r>
                   <a:rPr lang="ko-KR" altLang="en-US" dirty="0"/>
@@ -5025,8 +5045,8 @@
           </a:p>
         </p:txBody>
       </p:sp>
-      <mc:AlternateContent xmlns:mc="http://schemas.openxmlformats.org/markup-compatibility/2006">
-        <mc:Choice xmlns:a14="http://schemas.microsoft.com/office/drawing/2010/main" Requires="a14">
+      <mc:AlternateContent xmlns:mc="http://schemas.openxmlformats.org/markup-compatibility/2006" xmlns:a14="http://schemas.microsoft.com/office/drawing/2010/main">
+        <mc:Choice Requires="a14">
           <p:sp>
             <p:nvSpPr>
               <p:cNvPr id="3" name="내용 개체 틀 2">
@@ -5182,8 +5202,12 @@
               </a:p>
               <a:p>
                 <a:r>
+                  <a:rPr lang="en-US" altLang="ko-KR"/>
+                  <a:t>Which gets </a:t>
+                </a:r>
+                <a:r>
                   <a:rPr lang="en-US" altLang="ko-KR" dirty="0"/>
-                  <a:t>We would get computational benefits over just using diffusion on </a:t>
+                  <a:t>computational benefits over just using diffusion on </a:t>
                 </a:r>
                 <a14:m>
                   <m:oMath xmlns:m="http://schemas.openxmlformats.org/officeDocument/2006/math">
@@ -5200,7 +5224,7 @@
             </p:txBody>
           </p:sp>
         </mc:Choice>
-        <mc:Fallback>
+        <mc:Fallback xmlns="">
           <p:sp>
             <p:nvSpPr>
               <p:cNvPr id="3" name="내용 개체 틀 2">
@@ -5394,8 +5418,8 @@
           </a:p>
         </p:txBody>
       </p:sp>
-      <mc:AlternateContent xmlns:mc="http://schemas.openxmlformats.org/markup-compatibility/2006">
-        <mc:Choice xmlns:a14="http://schemas.microsoft.com/office/drawing/2010/main" Requires="a14">
+      <mc:AlternateContent xmlns:mc="http://schemas.openxmlformats.org/markup-compatibility/2006" xmlns:a14="http://schemas.microsoft.com/office/drawing/2010/main">
+        <mc:Choice Requires="a14">
           <p:sp>
             <p:nvSpPr>
               <p:cNvPr id="3" name="내용 개체 틀 2">
@@ -5633,7 +5657,7 @@
             </p:txBody>
           </p:sp>
         </mc:Choice>
-        <mc:Fallback>
+        <mc:Fallback xmlns="">
           <p:sp>
             <p:nvSpPr>
               <p:cNvPr id="3" name="내용 개체 틀 2">
@@ -5732,8 +5756,8 @@
           </a:p>
         </p:txBody>
       </p:sp>
-      <mc:AlternateContent xmlns:mc="http://schemas.openxmlformats.org/markup-compatibility/2006">
-        <mc:Choice xmlns:a14="http://schemas.microsoft.com/office/drawing/2010/main" Requires="a14">
+      <mc:AlternateContent xmlns:mc="http://schemas.openxmlformats.org/markup-compatibility/2006" xmlns:a14="http://schemas.microsoft.com/office/drawing/2010/main">
+        <mc:Choice Requires="a14">
           <p:sp>
             <p:nvSpPr>
               <p:cNvPr id="3" name="내용 개체 틀 2">
@@ -5759,18 +5783,12 @@
               <a:p>
                 <a:r>
                   <a:rPr lang="en-US" altLang="ko-KR" dirty="0"/>
-                  <a:t>VAE is known to (unintentionally) result in each channel obtaining an independent </a:t>
+                  <a:t>VAE is known to (unintentionally) result </a:t>
                 </a:r>
-                <a14:m>
-                  <m:oMath xmlns:m="http://schemas.openxmlformats.org/officeDocument/2006/math">
-                    <m:r>
-                      <a:rPr lang="en-US" altLang="ko-KR" b="0" i="1" smtClean="0">
-                        <a:latin typeface="Cambria Math" panose="02040503050406030204" pitchFamily="18" charset="0"/>
-                      </a:rPr>
-                      <m:t>𝑧</m:t>
-                    </m:r>
-                  </m:oMath>
-                </a14:m>
+                <a:r>
+                  <a:rPr lang="en-US" altLang="ko-KR"/>
+                  <a:t>in each channel obtaining an independent information</a:t>
+                </a:r>
                 <a:endParaRPr lang="en-US" altLang="ko-KR" dirty="0"/>
               </a:p>
               <a:p>
@@ -5802,7 +5820,7 @@
             </p:txBody>
           </p:sp>
         </mc:Choice>
-        <mc:Fallback>
+        <mc:Fallback xmlns="">
           <p:sp>
             <p:nvSpPr>
               <p:cNvPr id="3" name="내용 개체 틀 2">

</xml_diff>